<commit_message>
Update schematics and doc
</commit_message>
<xml_diff>
--- a/KernelDeveloperGuide/pptx/kernel_considerations.pptx
+++ b/KernelDeveloperGuide/pptx/kernel_considerations.pptx
@@ -235,7 +235,7 @@
               <a:rPr lang="fr-FR" smtClean="0">
                 <a:latin typeface="Calibri Regular" charset="0"/>
               </a:rPr>
-              <a:t>20/01/2026</a:t>
+              <a:t>27/01/2026</a:t>
             </a:fld>
             <a:endParaRPr lang="en-US" dirty="0">
               <a:latin typeface="Calibri Regular" charset="0"/>
@@ -423,7 +423,7 @@
           <a:p>
             <a:fld id="{D125E8DA-58CB-F841-A404-E11EC1E2C988}" type="datetime1">
               <a:rPr lang="fr-FR" smtClean="0"/>
-              <a:t>20/01/2026</a:t>
+              <a:t>27/01/2026</a:t>
             </a:fld>
             <a:endParaRPr lang="en-US" dirty="0"/>
           </a:p>
@@ -37128,8 +37128,8 @@
         </p:nvSpPr>
         <p:spPr>
           <a:xfrm>
-            <a:off x="1976741" y="3369610"/>
-            <a:ext cx="830959" cy="1706577"/>
+            <a:off x="1976741" y="4315737"/>
+            <a:ext cx="830959" cy="760450"/>
           </a:xfrm>
           <a:prstGeom prst="roundRect">
             <a:avLst>
@@ -37931,90 +37931,6 @@
           </p:txBody>
         </p:sp>
       </p:grpSp>
-      <p:pic>
-        <p:nvPicPr>
-          <p:cNvPr id="76" name="Picture 75">
-            <a:extLst>
-              <a:ext uri="{FF2B5EF4-FFF2-40B4-BE49-F238E27FC236}">
-                <a16:creationId xmlns:a16="http://schemas.microsoft.com/office/drawing/2014/main" id="{5156D551-2DAD-5BF8-BD64-552B6CB163D7}"/>
-              </a:ext>
-            </a:extLst>
-          </p:cNvPr>
-          <p:cNvPicPr>
-            <a:picLocks noChangeAspect="1"/>
-          </p:cNvPicPr>
-          <p:nvPr/>
-        </p:nvPicPr>
-        <p:blipFill>
-          <a:blip r:embed="rId7" cstate="print">
-            <a:extLst>
-              <a:ext uri="{28A0092B-C50C-407E-A947-70E740481C1C}">
-                <a14:useLocalDpi xmlns:a14="http://schemas.microsoft.com/office/drawing/2010/main" val="0"/>
-              </a:ext>
-            </a:extLst>
-          </a:blip>
-          <a:stretch>
-            <a:fillRect/>
-          </a:stretch>
-        </p:blipFill>
-        <p:spPr>
-          <a:xfrm>
-            <a:off x="4319758" y="3091283"/>
-            <a:ext cx="812842" cy="812842"/>
-          </a:xfrm>
-          <a:prstGeom prst="rect">
-            <a:avLst/>
-          </a:prstGeom>
-        </p:spPr>
-      </p:pic>
-      <p:cxnSp>
-        <p:nvCxnSpPr>
-          <p:cNvPr id="77" name="Elbow Connector 68">
-            <a:extLst>
-              <a:ext uri="{FF2B5EF4-FFF2-40B4-BE49-F238E27FC236}">
-                <a16:creationId xmlns:a16="http://schemas.microsoft.com/office/drawing/2014/main" id="{78BDD06B-BD68-3ECC-2722-505042510FA0}"/>
-              </a:ext>
-            </a:extLst>
-          </p:cNvPr>
-          <p:cNvCxnSpPr>
-            <a:cxnSpLocks/>
-            <a:stCxn id="28" idx="1"/>
-            <a:endCxn id="76" idx="1"/>
-          </p:cNvCxnSpPr>
-          <p:nvPr/>
-        </p:nvCxnSpPr>
-        <p:spPr>
-          <a:xfrm rot="10800000" flipH="1">
-            <a:off x="4109442" y="3497705"/>
-            <a:ext cx="210315" cy="1372561"/>
-          </a:xfrm>
-          <a:prstGeom prst="bentConnector3">
-            <a:avLst>
-              <a:gd name="adj1" fmla="val -559169"/>
-            </a:avLst>
-          </a:prstGeom>
-          <a:ln w="12700">
-            <a:solidFill>
-              <a:schemeClr val="tx1"/>
-            </a:solidFill>
-            <a:tailEnd type="triangle"/>
-          </a:ln>
-        </p:spPr>
-        <p:style>
-          <a:lnRef idx="1">
-            <a:schemeClr val="accent1"/>
-          </a:lnRef>
-          <a:fillRef idx="0">
-            <a:schemeClr val="accent1"/>
-          </a:fillRef>
-          <a:effectRef idx="0">
-            <a:schemeClr val="accent1"/>
-          </a:effectRef>
-          <a:fontRef idx="minor">
-            <a:schemeClr val="tx1"/>
-          </a:fontRef>
-        </p:style>
-      </p:cxnSp>
       <p:sp>
         <p:nvSpPr>
           <p:cNvPr id="87" name="TextBox 86">
@@ -38030,7 +37946,7 @@
         <p:spPr>
           <a:xfrm>
             <a:off x="3004102" y="3662339"/>
-            <a:ext cx="1060871" cy="1015663"/>
+            <a:ext cx="1060871" cy="1107996"/>
           </a:xfrm>
           <a:prstGeom prst="rect">
             <a:avLst/>
@@ -38044,7 +37960,7 @@
           <a:lstStyle/>
           <a:p>
             <a:r>
-              <a:rPr lang="en-US" sz="1200" dirty="0">
+              <a:rPr lang="en-US" sz="1100" dirty="0">
                 <a:solidFill>
                   <a:schemeClr val="tx2"/>
                 </a:solidFill>
@@ -38057,7 +37973,7 @@
           </a:p>
           <a:p>
             <a:r>
-              <a:rPr lang="en-US" sz="1200" dirty="0">
+              <a:rPr lang="en-US" sz="1100" dirty="0">
                 <a:solidFill>
                   <a:schemeClr val="tx2"/>
                 </a:solidFill>
@@ -38065,12 +37981,12 @@
                 <a:ea typeface="Source Sans Pro" charset="0"/>
                 <a:cs typeface="Source Sans Pro" charset="0"/>
               </a:rPr>
-              <a:t>in RAM, </a:t>
-            </a:r>
-          </a:p>
-          <a:p>
-            <a:r>
-              <a:rPr lang="en-US" sz="1200" dirty="0">
+              <a:t>in RAM, chunk-by-chunk, </a:t>
+            </a:r>
+          </a:p>
+          <a:p>
+            <a:r>
+              <a:rPr lang="en-US" sz="1100" dirty="0">
                 <a:solidFill>
                   <a:schemeClr val="tx2"/>
                 </a:solidFill>
@@ -38081,7 +37997,7 @@
               <a:t>in </a:t>
             </a:r>
             <a:r>
-              <a:rPr lang="en-US" sz="1200" b="1" dirty="0">
+              <a:rPr lang="en-US" sz="1100" b="1" dirty="0">
                 <a:solidFill>
                   <a:schemeClr val="tx2"/>
                 </a:solidFill>
@@ -38737,8 +38653,8 @@
         </p:nvSpPr>
         <p:spPr>
           <a:xfrm>
-            <a:off x="8000169" y="3347894"/>
-            <a:ext cx="830959" cy="1706577"/>
+            <a:off x="8000169" y="4294021"/>
+            <a:ext cx="830959" cy="760450"/>
           </a:xfrm>
           <a:prstGeom prst="roundRect">
             <a:avLst>
@@ -39172,8 +39088,8 @@
         </p:blipFill>
         <p:spPr>
           <a:xfrm>
-            <a:off x="10673564" y="3104206"/>
-            <a:ext cx="812842" cy="812842"/>
+            <a:off x="10826011" y="3176561"/>
+            <a:ext cx="265378" cy="265378"/>
           </a:xfrm>
           <a:prstGeom prst="rect">
             <a:avLst/>
@@ -39234,15 +39150,13 @@
           </p:cNvPr>
           <p:cNvCxnSpPr>
             <a:cxnSpLocks/>
-            <a:stCxn id="18" idx="3"/>
-            <a:endCxn id="149" idx="0"/>
           </p:cNvCxnSpPr>
           <p:nvPr/>
         </p:nvCxnSpPr>
         <p:spPr>
           <a:xfrm>
-            <a:off x="6577210" y="711445"/>
-            <a:ext cx="1336321" cy="2222198"/>
+            <a:off x="6583538" y="694895"/>
+            <a:ext cx="1712277" cy="2645917"/>
           </a:xfrm>
           <a:prstGeom prst="bentConnector2">
             <a:avLst/>
@@ -39438,8 +39352,8 @@
         </p:nvCxnSpPr>
         <p:spPr>
           <a:xfrm>
-            <a:off x="8957647" y="3662339"/>
-            <a:ext cx="1693509" cy="0"/>
+            <a:off x="8826838" y="3662339"/>
+            <a:ext cx="1824318" cy="0"/>
           </a:xfrm>
           <a:prstGeom prst="straightConnector1">
             <a:avLst/>
@@ -39604,7 +39518,7 @@
         </p:blipFill>
         <p:spPr>
           <a:xfrm>
-            <a:off x="10628002" y="3087371"/>
+            <a:off x="10679825" y="3091606"/>
             <a:ext cx="324794" cy="324794"/>
           </a:xfrm>
           <a:prstGeom prst="rect">
@@ -39834,7 +39748,7 @@
         <p:spPr>
           <a:xfrm>
             <a:off x="8957192" y="3259870"/>
-            <a:ext cx="1670810" cy="0"/>
+            <a:ext cx="1734621" cy="0"/>
           </a:xfrm>
           <a:prstGeom prst="straightConnector1">
             <a:avLst/>
@@ -40021,7 +39935,7 @@
         </p:nvSpPr>
         <p:spPr>
           <a:xfrm>
-            <a:off x="1105831" y="5581085"/>
+            <a:off x="1019622" y="5565846"/>
             <a:ext cx="4178053" cy="307777"/>
           </a:xfrm>
           <a:prstGeom prst="rect">
@@ -40044,19 +39958,20 @@
               </a:spcAft>
             </a:pPr>
             <a:r>
-              <a:rPr lang="en-US" sz="2000" b="1" i="0" spc="0" dirty="0">
-                <a:ln>
-                  <a:noFill/>
-                </a:ln>
-                <a:solidFill>
-                  <a:schemeClr val="tx2"/>
-                </a:solidFill>
-                <a:latin typeface="+mj-lt"/>
-                <a:ea typeface="Source Sans Pro Light" charset="0"/>
-                <a:cs typeface="Source Sans Pro Light" charset="0"/>
-              </a:rPr>
-              <a:t>SHADOWING (Copy to RAM) </a:t>
-            </a:r>
+              <a:rPr lang="en-US" sz="2000" b="1" dirty="0"/>
+              <a:t>Copy-to-RAM based execution</a:t>
+            </a:r>
+            <a:endParaRPr lang="en-US" sz="2000" b="1" i="0" spc="0" dirty="0">
+              <a:ln>
+                <a:noFill/>
+              </a:ln>
+              <a:solidFill>
+                <a:schemeClr val="tx2"/>
+              </a:solidFill>
+              <a:latin typeface="+mj-lt"/>
+              <a:ea typeface="Source Sans Pro Light" charset="0"/>
+              <a:cs typeface="Source Sans Pro Light" charset="0"/>
+            </a:endParaRPr>
           </a:p>
         </p:txBody>
       </p:sp>
@@ -40074,7 +39989,7 @@
         </p:nvSpPr>
         <p:spPr>
           <a:xfrm>
-            <a:off x="7609157" y="5529989"/>
+            <a:off x="7430572" y="5565846"/>
             <a:ext cx="3787633" cy="307777"/>
           </a:xfrm>
           <a:prstGeom prst="rect">
@@ -40101,9 +40016,6 @@
                 <a:ln>
                   <a:noFill/>
                 </a:ln>
-                <a:solidFill>
-                  <a:schemeClr val="tx2"/>
-                </a:solidFill>
                 <a:latin typeface="+mj-lt"/>
                 <a:ea typeface="Source Sans Pro Light" charset="0"/>
                 <a:cs typeface="Source Sans Pro Light" charset="0"/>
@@ -40113,6 +40025,1575 @@
           </a:p>
         </p:txBody>
       </p:sp>
+      <p:sp>
+        <p:nvSpPr>
+          <p:cNvPr id="2" name="Rounded Rectangle 10">
+            <a:extLst>
+              <a:ext uri="{FF2B5EF4-FFF2-40B4-BE49-F238E27FC236}">
+                <a16:creationId xmlns:a16="http://schemas.microsoft.com/office/drawing/2014/main" id="{7EF48DE9-2CAD-84B1-9CA0-80DB18561E78}"/>
+              </a:ext>
+            </a:extLst>
+          </p:cNvPr>
+          <p:cNvSpPr/>
+          <p:nvPr/>
+        </p:nvSpPr>
+        <p:spPr>
+          <a:xfrm>
+            <a:off x="7995879" y="3347894"/>
+            <a:ext cx="830959" cy="760450"/>
+          </a:xfrm>
+          <a:prstGeom prst="roundRect">
+            <a:avLst>
+              <a:gd name="adj" fmla="val 7525"/>
+            </a:avLst>
+          </a:prstGeom>
+          <a:solidFill>
+            <a:schemeClr val="tx1"/>
+          </a:solidFill>
+          <a:ln w="9525">
+            <a:solidFill>
+              <a:schemeClr val="bg1"/>
+            </a:solidFill>
+          </a:ln>
+          <a:effectLst/>
+        </p:spPr>
+        <p:style>
+          <a:lnRef idx="2">
+            <a:schemeClr val="dk1">
+              <a:shade val="50000"/>
+            </a:schemeClr>
+          </a:lnRef>
+          <a:fillRef idx="1">
+            <a:schemeClr val="dk1"/>
+          </a:fillRef>
+          <a:effectRef idx="0">
+            <a:schemeClr val="dk1"/>
+          </a:effectRef>
+          <a:fontRef idx="minor">
+            <a:schemeClr val="lt1"/>
+          </a:fontRef>
+        </p:style>
+        <p:txBody>
+          <a:bodyPr lIns="0" rIns="0" rtlCol="0" anchor="t"/>
+          <a:lstStyle/>
+          <a:p>
+            <a:pPr algn="ctr">
+              <a:defRPr/>
+            </a:pPr>
+            <a:r>
+              <a:rPr lang="en-US" sz="900" dirty="0">
+                <a:solidFill>
+                  <a:srgbClr val="FFFFFF"/>
+                </a:solidFill>
+                <a:latin typeface="Source Sans Pro Light" charset="0"/>
+                <a:ea typeface="Source Sans Pro Light" charset="0"/>
+                <a:cs typeface="Source Sans Pro Light" charset="0"/>
+              </a:rPr>
+              <a:t>.</a:t>
+            </a:r>
+            <a:r>
+              <a:rPr lang="en-US" sz="900" dirty="0" err="1">
+                <a:solidFill>
+                  <a:srgbClr val="FFFFFF"/>
+                </a:solidFill>
+                <a:latin typeface="Source Sans Pro Light" charset="0"/>
+                <a:ea typeface="Source Sans Pro Light" charset="0"/>
+                <a:cs typeface="Source Sans Pro Light" charset="0"/>
+              </a:rPr>
+              <a:t>fo</a:t>
+            </a:r>
+            <a:r>
+              <a:rPr lang="en-US" sz="900" dirty="0">
+                <a:solidFill>
+                  <a:srgbClr val="FFFFFF"/>
+                </a:solidFill>
+                <a:latin typeface="Source Sans Pro Light" charset="0"/>
+                <a:ea typeface="Source Sans Pro Light" charset="0"/>
+                <a:cs typeface="Source Sans Pro Light" charset="0"/>
+              </a:rPr>
+              <a:t> chunk Buffer</a:t>
+            </a:r>
+            <a:br>
+              <a:rPr lang="en-US" sz="900" dirty="0">
+                <a:solidFill>
+                  <a:srgbClr val="FFFFFF"/>
+                </a:solidFill>
+                <a:latin typeface="Source Sans Pro Light" charset="0"/>
+                <a:ea typeface="Source Sans Pro Light" charset="0"/>
+                <a:cs typeface="Source Sans Pro Light" charset="0"/>
+              </a:rPr>
+            </a:br>
+            <a:r>
+              <a:rPr lang="en-US" sz="900" dirty="0">
+                <a:solidFill>
+                  <a:srgbClr val="FFFFFF"/>
+                </a:solidFill>
+                <a:latin typeface="Source Sans Pro Light" charset="0"/>
+                <a:ea typeface="Source Sans Pro Light" charset="0"/>
+                <a:cs typeface="Source Sans Pro Light" charset="0"/>
+              </a:rPr>
+              <a:t>(min 512 bytes chunks)</a:t>
+            </a:r>
+          </a:p>
+        </p:txBody>
+      </p:sp>
+      <p:pic>
+        <p:nvPicPr>
+          <p:cNvPr id="11" name="Picture 10">
+            <a:extLst>
+              <a:ext uri="{FF2B5EF4-FFF2-40B4-BE49-F238E27FC236}">
+                <a16:creationId xmlns:a16="http://schemas.microsoft.com/office/drawing/2014/main" id="{8C6C4D89-D9D5-CC65-3C47-5E1A1356BEAB}"/>
+              </a:ext>
+            </a:extLst>
+          </p:cNvPr>
+          <p:cNvPicPr>
+            <a:picLocks noChangeAspect="1"/>
+          </p:cNvPicPr>
+          <p:nvPr/>
+        </p:nvPicPr>
+        <p:blipFill>
+          <a:blip r:embed="rId9" cstate="print">
+            <a:grayscl/>
+            <a:extLst>
+              <a:ext uri="{28A0092B-C50C-407E-A947-70E740481C1C}">
+                <a14:useLocalDpi xmlns:a14="http://schemas.microsoft.com/office/drawing/2010/main" val="0"/>
+              </a:ext>
+            </a:extLst>
+          </a:blip>
+          <a:stretch>
+            <a:fillRect/>
+          </a:stretch>
+        </p:blipFill>
+        <p:spPr>
+          <a:xfrm>
+            <a:off x="8366664" y="827020"/>
+            <a:ext cx="132269" cy="132269"/>
+          </a:xfrm>
+          <a:prstGeom prst="rect">
+            <a:avLst/>
+          </a:prstGeom>
+        </p:spPr>
+      </p:pic>
+      <p:pic>
+        <p:nvPicPr>
+          <p:cNvPr id="14" name="Picture 13">
+            <a:extLst>
+              <a:ext uri="{FF2B5EF4-FFF2-40B4-BE49-F238E27FC236}">
+                <a16:creationId xmlns:a16="http://schemas.microsoft.com/office/drawing/2014/main" id="{9C2F8674-0DE5-17A4-9E26-7ADFD0592A34}"/>
+              </a:ext>
+            </a:extLst>
+          </p:cNvPr>
+          <p:cNvPicPr>
+            <a:picLocks noChangeAspect="1"/>
+          </p:cNvPicPr>
+          <p:nvPr/>
+        </p:nvPicPr>
+        <p:blipFill>
+          <a:blip r:embed="rId7" cstate="print">
+            <a:extLst>
+              <a:ext uri="{28A0092B-C50C-407E-A947-70E740481C1C}">
+                <a14:useLocalDpi xmlns:a14="http://schemas.microsoft.com/office/drawing/2010/main" val="0"/>
+              </a:ext>
+            </a:extLst>
+          </a:blip>
+          <a:stretch>
+            <a:fillRect/>
+          </a:stretch>
+        </p:blipFill>
+        <p:spPr>
+          <a:xfrm>
+            <a:off x="11035391" y="3176561"/>
+            <a:ext cx="265378" cy="265378"/>
+          </a:xfrm>
+          <a:prstGeom prst="rect">
+            <a:avLst/>
+          </a:prstGeom>
+        </p:spPr>
+      </p:pic>
+      <p:pic>
+        <p:nvPicPr>
+          <p:cNvPr id="15" name="Picture 14">
+            <a:extLst>
+              <a:ext uri="{FF2B5EF4-FFF2-40B4-BE49-F238E27FC236}">
+                <a16:creationId xmlns:a16="http://schemas.microsoft.com/office/drawing/2014/main" id="{B78B6048-D919-ED37-72B5-FCA929033A27}"/>
+              </a:ext>
+            </a:extLst>
+          </p:cNvPr>
+          <p:cNvPicPr>
+            <a:picLocks noChangeAspect="1"/>
+          </p:cNvPicPr>
+          <p:nvPr/>
+        </p:nvPicPr>
+        <p:blipFill>
+          <a:blip r:embed="rId7" cstate="print">
+            <a:extLst>
+              <a:ext uri="{28A0092B-C50C-407E-A947-70E740481C1C}">
+                <a14:useLocalDpi xmlns:a14="http://schemas.microsoft.com/office/drawing/2010/main" val="0"/>
+              </a:ext>
+            </a:extLst>
+          </a:blip>
+          <a:stretch>
+            <a:fillRect/>
+          </a:stretch>
+        </p:blipFill>
+        <p:spPr>
+          <a:xfrm>
+            <a:off x="11244771" y="3177477"/>
+            <a:ext cx="265378" cy="265378"/>
+          </a:xfrm>
+          <a:prstGeom prst="rect">
+            <a:avLst/>
+          </a:prstGeom>
+        </p:spPr>
+      </p:pic>
+      <p:pic>
+        <p:nvPicPr>
+          <p:cNvPr id="25" name="Picture 24">
+            <a:extLst>
+              <a:ext uri="{FF2B5EF4-FFF2-40B4-BE49-F238E27FC236}">
+                <a16:creationId xmlns:a16="http://schemas.microsoft.com/office/drawing/2014/main" id="{ED4A7A06-6D2E-C8EF-4717-FCF7E30A89FB}"/>
+              </a:ext>
+            </a:extLst>
+          </p:cNvPr>
+          <p:cNvPicPr>
+            <a:picLocks noChangeAspect="1"/>
+          </p:cNvPicPr>
+          <p:nvPr/>
+        </p:nvPicPr>
+        <p:blipFill>
+          <a:blip r:embed="rId7" cstate="print">
+            <a:extLst>
+              <a:ext uri="{28A0092B-C50C-407E-A947-70E740481C1C}">
+                <a14:useLocalDpi xmlns:a14="http://schemas.microsoft.com/office/drawing/2010/main" val="0"/>
+              </a:ext>
+            </a:extLst>
+          </a:blip>
+          <a:stretch>
+            <a:fillRect/>
+          </a:stretch>
+        </p:blipFill>
+        <p:spPr>
+          <a:xfrm>
+            <a:off x="10826011" y="3391357"/>
+            <a:ext cx="265378" cy="265378"/>
+          </a:xfrm>
+          <a:prstGeom prst="rect">
+            <a:avLst/>
+          </a:prstGeom>
+        </p:spPr>
+      </p:pic>
+      <p:pic>
+        <p:nvPicPr>
+          <p:cNvPr id="26" name="Picture 25">
+            <a:extLst>
+              <a:ext uri="{FF2B5EF4-FFF2-40B4-BE49-F238E27FC236}">
+                <a16:creationId xmlns:a16="http://schemas.microsoft.com/office/drawing/2014/main" id="{61E2B166-A0B7-8675-161A-FF49135E34D9}"/>
+              </a:ext>
+            </a:extLst>
+          </p:cNvPr>
+          <p:cNvPicPr>
+            <a:picLocks noChangeAspect="1"/>
+          </p:cNvPicPr>
+          <p:nvPr/>
+        </p:nvPicPr>
+        <p:blipFill>
+          <a:blip r:embed="rId7" cstate="print">
+            <a:extLst>
+              <a:ext uri="{28A0092B-C50C-407E-A947-70E740481C1C}">
+                <a14:useLocalDpi xmlns:a14="http://schemas.microsoft.com/office/drawing/2010/main" val="0"/>
+              </a:ext>
+            </a:extLst>
+          </a:blip>
+          <a:stretch>
+            <a:fillRect/>
+          </a:stretch>
+        </p:blipFill>
+        <p:spPr>
+          <a:xfrm>
+            <a:off x="11035391" y="3391357"/>
+            <a:ext cx="265378" cy="265378"/>
+          </a:xfrm>
+          <a:prstGeom prst="rect">
+            <a:avLst/>
+          </a:prstGeom>
+        </p:spPr>
+      </p:pic>
+      <p:pic>
+        <p:nvPicPr>
+          <p:cNvPr id="29" name="Picture 28">
+            <a:extLst>
+              <a:ext uri="{FF2B5EF4-FFF2-40B4-BE49-F238E27FC236}">
+                <a16:creationId xmlns:a16="http://schemas.microsoft.com/office/drawing/2014/main" id="{3ADDC9EC-5FA9-8175-88AB-BA830DB92C2F}"/>
+              </a:ext>
+            </a:extLst>
+          </p:cNvPr>
+          <p:cNvPicPr>
+            <a:picLocks noChangeAspect="1"/>
+          </p:cNvPicPr>
+          <p:nvPr/>
+        </p:nvPicPr>
+        <p:blipFill>
+          <a:blip r:embed="rId7" cstate="print">
+            <a:extLst>
+              <a:ext uri="{28A0092B-C50C-407E-A947-70E740481C1C}">
+                <a14:useLocalDpi xmlns:a14="http://schemas.microsoft.com/office/drawing/2010/main" val="0"/>
+              </a:ext>
+            </a:extLst>
+          </a:blip>
+          <a:stretch>
+            <a:fillRect/>
+          </a:stretch>
+        </p:blipFill>
+        <p:spPr>
+          <a:xfrm>
+            <a:off x="11244771" y="3392273"/>
+            <a:ext cx="265378" cy="265378"/>
+          </a:xfrm>
+          <a:prstGeom prst="rect">
+            <a:avLst/>
+          </a:prstGeom>
+        </p:spPr>
+      </p:pic>
+      <p:pic>
+        <p:nvPicPr>
+          <p:cNvPr id="31" name="Picture 30">
+            <a:extLst>
+              <a:ext uri="{FF2B5EF4-FFF2-40B4-BE49-F238E27FC236}">
+                <a16:creationId xmlns:a16="http://schemas.microsoft.com/office/drawing/2014/main" id="{AC25C837-3A09-09BD-7D0C-7BA8790AC251}"/>
+              </a:ext>
+            </a:extLst>
+          </p:cNvPr>
+          <p:cNvPicPr>
+            <a:picLocks noChangeAspect="1"/>
+          </p:cNvPicPr>
+          <p:nvPr/>
+        </p:nvPicPr>
+        <p:blipFill>
+          <a:blip r:embed="rId7" cstate="print">
+            <a:extLst>
+              <a:ext uri="{28A0092B-C50C-407E-A947-70E740481C1C}">
+                <a14:useLocalDpi xmlns:a14="http://schemas.microsoft.com/office/drawing/2010/main" val="0"/>
+              </a:ext>
+            </a:extLst>
+          </a:blip>
+          <a:stretch>
+            <a:fillRect/>
+          </a:stretch>
+        </p:blipFill>
+        <p:spPr>
+          <a:xfrm rot="20834435">
+            <a:off x="10654030" y="3576520"/>
+            <a:ext cx="265378" cy="265378"/>
+          </a:xfrm>
+          <a:prstGeom prst="rect">
+            <a:avLst/>
+          </a:prstGeom>
+        </p:spPr>
+      </p:pic>
+      <p:pic>
+        <p:nvPicPr>
+          <p:cNvPr id="47" name="Picture 46">
+            <a:extLst>
+              <a:ext uri="{FF2B5EF4-FFF2-40B4-BE49-F238E27FC236}">
+                <a16:creationId xmlns:a16="http://schemas.microsoft.com/office/drawing/2014/main" id="{17471621-1CC2-853F-83C3-439B552A5197}"/>
+              </a:ext>
+            </a:extLst>
+          </p:cNvPr>
+          <p:cNvPicPr>
+            <a:picLocks noChangeAspect="1"/>
+          </p:cNvPicPr>
+          <p:nvPr/>
+        </p:nvPicPr>
+        <p:blipFill>
+          <a:blip r:embed="rId7" cstate="print">
+            <a:extLst>
+              <a:ext uri="{28A0092B-C50C-407E-A947-70E740481C1C}">
+                <a14:useLocalDpi xmlns:a14="http://schemas.microsoft.com/office/drawing/2010/main" val="0"/>
+              </a:ext>
+            </a:extLst>
+          </a:blip>
+          <a:stretch>
+            <a:fillRect/>
+          </a:stretch>
+        </p:blipFill>
+        <p:spPr>
+          <a:xfrm>
+            <a:off x="11034224" y="3593207"/>
+            <a:ext cx="265378" cy="265378"/>
+          </a:xfrm>
+          <a:prstGeom prst="rect">
+            <a:avLst/>
+          </a:prstGeom>
+        </p:spPr>
+      </p:pic>
+      <p:pic>
+        <p:nvPicPr>
+          <p:cNvPr id="48" name="Picture 47">
+            <a:extLst>
+              <a:ext uri="{FF2B5EF4-FFF2-40B4-BE49-F238E27FC236}">
+                <a16:creationId xmlns:a16="http://schemas.microsoft.com/office/drawing/2014/main" id="{928FAB23-9BAD-2C08-AA93-B1CEE11FEF28}"/>
+              </a:ext>
+            </a:extLst>
+          </p:cNvPr>
+          <p:cNvPicPr>
+            <a:picLocks noChangeAspect="1"/>
+          </p:cNvPicPr>
+          <p:nvPr/>
+        </p:nvPicPr>
+        <p:blipFill>
+          <a:blip r:embed="rId7" cstate="print">
+            <a:extLst>
+              <a:ext uri="{28A0092B-C50C-407E-A947-70E740481C1C}">
+                <a14:useLocalDpi xmlns:a14="http://schemas.microsoft.com/office/drawing/2010/main" val="0"/>
+              </a:ext>
+            </a:extLst>
+          </a:blip>
+          <a:stretch>
+            <a:fillRect/>
+          </a:stretch>
+        </p:blipFill>
+        <p:spPr>
+          <a:xfrm>
+            <a:off x="11243604" y="3594123"/>
+            <a:ext cx="265378" cy="265378"/>
+          </a:xfrm>
+          <a:prstGeom prst="rect">
+            <a:avLst/>
+          </a:prstGeom>
+        </p:spPr>
+      </p:pic>
+      <p:sp>
+        <p:nvSpPr>
+          <p:cNvPr id="50" name="TextBox 49">
+            <a:extLst>
+              <a:ext uri="{FF2B5EF4-FFF2-40B4-BE49-F238E27FC236}">
+                <a16:creationId xmlns:a16="http://schemas.microsoft.com/office/drawing/2014/main" id="{8AF1C69F-445F-1619-AD5F-F130C3385F03}"/>
+              </a:ext>
+            </a:extLst>
+          </p:cNvPr>
+          <p:cNvSpPr txBox="1"/>
+          <p:nvPr/>
+        </p:nvSpPr>
+        <p:spPr>
+          <a:xfrm>
+            <a:off x="8616280" y="940961"/>
+            <a:ext cx="907451" cy="430887"/>
+          </a:xfrm>
+          <a:prstGeom prst="rect">
+            <a:avLst/>
+          </a:prstGeom>
+          <a:noFill/>
+        </p:spPr>
+        <p:txBody>
+          <a:bodyPr vert="horz" wrap="square" lIns="0" tIns="0" rIns="0" bIns="0" numCol="1" spcCol="288000" rtlCol="0" anchor="t" anchorCtr="0">
+            <a:spAutoFit/>
+          </a:bodyPr>
+          <a:lstStyle/>
+          <a:p>
+            <a:pPr algn="l">
+              <a:spcBef>
+                <a:spcPts val="0"/>
+              </a:spcBef>
+              <a:spcAft>
+                <a:spcPts val="600"/>
+              </a:spcAft>
+            </a:pPr>
+            <a:r>
+              <a:rPr lang="en-US" sz="1400" b="0" i="0" spc="0" dirty="0">
+                <a:ln>
+                  <a:noFill/>
+                </a:ln>
+                <a:solidFill>
+                  <a:schemeClr val="tx2"/>
+                </a:solidFill>
+                <a:latin typeface="Source Sans Pro Light" charset="0"/>
+                <a:ea typeface="Source Sans Pro Light" charset="0"/>
+                <a:cs typeface="Source Sans Pro Light" charset="0"/>
+              </a:rPr>
+              <a:t>App.fo</a:t>
+            </a:r>
+            <a:br>
+              <a:rPr lang="en-US" sz="1400" b="0" i="0" spc="0" dirty="0">
+                <a:ln>
+                  <a:noFill/>
+                </a:ln>
+                <a:solidFill>
+                  <a:schemeClr val="tx2"/>
+                </a:solidFill>
+                <a:latin typeface="Source Sans Pro Light" charset="0"/>
+                <a:ea typeface="Source Sans Pro Light" charset="0"/>
+                <a:cs typeface="Source Sans Pro Light" charset="0"/>
+              </a:rPr>
+            </a:br>
+            <a:r>
+              <a:rPr lang="en-US" sz="1400" b="0" i="0" spc="0" dirty="0">
+                <a:ln>
+                  <a:noFill/>
+                </a:ln>
+                <a:solidFill>
+                  <a:schemeClr val="tx2"/>
+                </a:solidFill>
+                <a:latin typeface="Source Sans Pro Light" charset="0"/>
+                <a:ea typeface="Source Sans Pro Light" charset="0"/>
+                <a:cs typeface="Source Sans Pro Light" charset="0"/>
+              </a:rPr>
+              <a:t>packets</a:t>
+            </a:r>
+          </a:p>
+        </p:txBody>
+      </p:sp>
+      <p:pic>
+        <p:nvPicPr>
+          <p:cNvPr id="60" name="Picture 59">
+            <a:extLst>
+              <a:ext uri="{FF2B5EF4-FFF2-40B4-BE49-F238E27FC236}">
+                <a16:creationId xmlns:a16="http://schemas.microsoft.com/office/drawing/2014/main" id="{B3B3CE10-917F-8AC8-CB3B-3EE58720E79A}"/>
+              </a:ext>
+            </a:extLst>
+          </p:cNvPr>
+          <p:cNvPicPr>
+            <a:picLocks noChangeAspect="1"/>
+          </p:cNvPicPr>
+          <p:nvPr/>
+        </p:nvPicPr>
+        <p:blipFill>
+          <a:blip r:embed="rId7" cstate="print">
+            <a:extLst>
+              <a:ext uri="{28A0092B-C50C-407E-A947-70E740481C1C}">
+                <a14:useLocalDpi xmlns:a14="http://schemas.microsoft.com/office/drawing/2010/main" val="0"/>
+              </a:ext>
+            </a:extLst>
+          </a:blip>
+          <a:stretch>
+            <a:fillRect/>
+          </a:stretch>
+        </p:blipFill>
+        <p:spPr>
+          <a:xfrm>
+            <a:off x="4437838" y="3171479"/>
+            <a:ext cx="265378" cy="265378"/>
+          </a:xfrm>
+          <a:prstGeom prst="rect">
+            <a:avLst/>
+          </a:prstGeom>
+        </p:spPr>
+      </p:pic>
+      <p:pic>
+        <p:nvPicPr>
+          <p:cNvPr id="62" name="Picture 61">
+            <a:extLst>
+              <a:ext uri="{FF2B5EF4-FFF2-40B4-BE49-F238E27FC236}">
+                <a16:creationId xmlns:a16="http://schemas.microsoft.com/office/drawing/2014/main" id="{D6E914A1-BC6C-C29E-83A1-93FCD61CB433}"/>
+              </a:ext>
+            </a:extLst>
+          </p:cNvPr>
+          <p:cNvPicPr>
+            <a:picLocks noChangeAspect="1"/>
+          </p:cNvPicPr>
+          <p:nvPr/>
+        </p:nvPicPr>
+        <p:blipFill>
+          <a:blip r:embed="rId7" cstate="print">
+            <a:extLst>
+              <a:ext uri="{28A0092B-C50C-407E-A947-70E740481C1C}">
+                <a14:useLocalDpi xmlns:a14="http://schemas.microsoft.com/office/drawing/2010/main" val="0"/>
+              </a:ext>
+            </a:extLst>
+          </a:blip>
+          <a:stretch>
+            <a:fillRect/>
+          </a:stretch>
+        </p:blipFill>
+        <p:spPr>
+          <a:xfrm>
+            <a:off x="4647218" y="3171479"/>
+            <a:ext cx="265378" cy="265378"/>
+          </a:xfrm>
+          <a:prstGeom prst="rect">
+            <a:avLst/>
+          </a:prstGeom>
+        </p:spPr>
+      </p:pic>
+      <p:pic>
+        <p:nvPicPr>
+          <p:cNvPr id="63" name="Picture 62">
+            <a:extLst>
+              <a:ext uri="{FF2B5EF4-FFF2-40B4-BE49-F238E27FC236}">
+                <a16:creationId xmlns:a16="http://schemas.microsoft.com/office/drawing/2014/main" id="{A71A6F53-49E5-A62B-A7DC-4BCF5E7B899D}"/>
+              </a:ext>
+            </a:extLst>
+          </p:cNvPr>
+          <p:cNvPicPr>
+            <a:picLocks noChangeAspect="1"/>
+          </p:cNvPicPr>
+          <p:nvPr/>
+        </p:nvPicPr>
+        <p:blipFill>
+          <a:blip r:embed="rId7" cstate="print">
+            <a:extLst>
+              <a:ext uri="{28A0092B-C50C-407E-A947-70E740481C1C}">
+                <a14:useLocalDpi xmlns:a14="http://schemas.microsoft.com/office/drawing/2010/main" val="0"/>
+              </a:ext>
+            </a:extLst>
+          </a:blip>
+          <a:stretch>
+            <a:fillRect/>
+          </a:stretch>
+        </p:blipFill>
+        <p:spPr>
+          <a:xfrm>
+            <a:off x="4856598" y="3172395"/>
+            <a:ext cx="265378" cy="265378"/>
+          </a:xfrm>
+          <a:prstGeom prst="rect">
+            <a:avLst/>
+          </a:prstGeom>
+        </p:spPr>
+      </p:pic>
+      <p:pic>
+        <p:nvPicPr>
+          <p:cNvPr id="64" name="Picture 63">
+            <a:extLst>
+              <a:ext uri="{FF2B5EF4-FFF2-40B4-BE49-F238E27FC236}">
+                <a16:creationId xmlns:a16="http://schemas.microsoft.com/office/drawing/2014/main" id="{7D7FA1C0-299D-CE5E-997D-088825DDF641}"/>
+              </a:ext>
+            </a:extLst>
+          </p:cNvPr>
+          <p:cNvPicPr>
+            <a:picLocks noChangeAspect="1"/>
+          </p:cNvPicPr>
+          <p:nvPr/>
+        </p:nvPicPr>
+        <p:blipFill>
+          <a:blip r:embed="rId7" cstate="print">
+            <a:extLst>
+              <a:ext uri="{28A0092B-C50C-407E-A947-70E740481C1C}">
+                <a14:useLocalDpi xmlns:a14="http://schemas.microsoft.com/office/drawing/2010/main" val="0"/>
+              </a:ext>
+            </a:extLst>
+          </a:blip>
+          <a:stretch>
+            <a:fillRect/>
+          </a:stretch>
+        </p:blipFill>
+        <p:spPr>
+          <a:xfrm>
+            <a:off x="4437838" y="3386275"/>
+            <a:ext cx="265378" cy="265378"/>
+          </a:xfrm>
+          <a:prstGeom prst="rect">
+            <a:avLst/>
+          </a:prstGeom>
+        </p:spPr>
+      </p:pic>
+      <p:pic>
+        <p:nvPicPr>
+          <p:cNvPr id="65" name="Picture 64">
+            <a:extLst>
+              <a:ext uri="{FF2B5EF4-FFF2-40B4-BE49-F238E27FC236}">
+                <a16:creationId xmlns:a16="http://schemas.microsoft.com/office/drawing/2014/main" id="{324EEDD0-8CD9-A464-C930-83F5E4572263}"/>
+              </a:ext>
+            </a:extLst>
+          </p:cNvPr>
+          <p:cNvPicPr>
+            <a:picLocks noChangeAspect="1"/>
+          </p:cNvPicPr>
+          <p:nvPr/>
+        </p:nvPicPr>
+        <p:blipFill>
+          <a:blip r:embed="rId7" cstate="print">
+            <a:extLst>
+              <a:ext uri="{28A0092B-C50C-407E-A947-70E740481C1C}">
+                <a14:useLocalDpi xmlns:a14="http://schemas.microsoft.com/office/drawing/2010/main" val="0"/>
+              </a:ext>
+            </a:extLst>
+          </a:blip>
+          <a:stretch>
+            <a:fillRect/>
+          </a:stretch>
+        </p:blipFill>
+        <p:spPr>
+          <a:xfrm>
+            <a:off x="4647218" y="3386275"/>
+            <a:ext cx="265378" cy="265378"/>
+          </a:xfrm>
+          <a:prstGeom prst="rect">
+            <a:avLst/>
+          </a:prstGeom>
+        </p:spPr>
+      </p:pic>
+      <p:pic>
+        <p:nvPicPr>
+          <p:cNvPr id="70" name="Picture 69">
+            <a:extLst>
+              <a:ext uri="{FF2B5EF4-FFF2-40B4-BE49-F238E27FC236}">
+                <a16:creationId xmlns:a16="http://schemas.microsoft.com/office/drawing/2014/main" id="{527F3A86-3D69-8D50-3555-B3B7155EEA69}"/>
+              </a:ext>
+            </a:extLst>
+          </p:cNvPr>
+          <p:cNvPicPr>
+            <a:picLocks noChangeAspect="1"/>
+          </p:cNvPicPr>
+          <p:nvPr/>
+        </p:nvPicPr>
+        <p:blipFill>
+          <a:blip r:embed="rId7" cstate="print">
+            <a:extLst>
+              <a:ext uri="{28A0092B-C50C-407E-A947-70E740481C1C}">
+                <a14:useLocalDpi xmlns:a14="http://schemas.microsoft.com/office/drawing/2010/main" val="0"/>
+              </a:ext>
+            </a:extLst>
+          </a:blip>
+          <a:stretch>
+            <a:fillRect/>
+          </a:stretch>
+        </p:blipFill>
+        <p:spPr>
+          <a:xfrm>
+            <a:off x="4856598" y="3387191"/>
+            <a:ext cx="265378" cy="265378"/>
+          </a:xfrm>
+          <a:prstGeom prst="rect">
+            <a:avLst/>
+          </a:prstGeom>
+        </p:spPr>
+      </p:pic>
+      <p:pic>
+        <p:nvPicPr>
+          <p:cNvPr id="71" name="Picture 70">
+            <a:extLst>
+              <a:ext uri="{FF2B5EF4-FFF2-40B4-BE49-F238E27FC236}">
+                <a16:creationId xmlns:a16="http://schemas.microsoft.com/office/drawing/2014/main" id="{F1375AFF-A741-1807-B47A-A6D2F27744FD}"/>
+              </a:ext>
+            </a:extLst>
+          </p:cNvPr>
+          <p:cNvPicPr>
+            <a:picLocks noChangeAspect="1"/>
+          </p:cNvPicPr>
+          <p:nvPr/>
+        </p:nvPicPr>
+        <p:blipFill>
+          <a:blip r:embed="rId7" cstate="print">
+            <a:extLst>
+              <a:ext uri="{28A0092B-C50C-407E-A947-70E740481C1C}">
+                <a14:useLocalDpi xmlns:a14="http://schemas.microsoft.com/office/drawing/2010/main" val="0"/>
+              </a:ext>
+            </a:extLst>
+          </a:blip>
+          <a:stretch>
+            <a:fillRect/>
+          </a:stretch>
+        </p:blipFill>
+        <p:spPr>
+          <a:xfrm rot="20834435">
+            <a:off x="4265857" y="3571438"/>
+            <a:ext cx="265378" cy="265378"/>
+          </a:xfrm>
+          <a:prstGeom prst="rect">
+            <a:avLst/>
+          </a:prstGeom>
+        </p:spPr>
+      </p:pic>
+      <p:pic>
+        <p:nvPicPr>
+          <p:cNvPr id="72" name="Picture 71">
+            <a:extLst>
+              <a:ext uri="{FF2B5EF4-FFF2-40B4-BE49-F238E27FC236}">
+                <a16:creationId xmlns:a16="http://schemas.microsoft.com/office/drawing/2014/main" id="{748F4F32-1BC2-BC5E-7995-17BA0C4ACC12}"/>
+              </a:ext>
+            </a:extLst>
+          </p:cNvPr>
+          <p:cNvPicPr>
+            <a:picLocks noChangeAspect="1"/>
+          </p:cNvPicPr>
+          <p:nvPr/>
+        </p:nvPicPr>
+        <p:blipFill>
+          <a:blip r:embed="rId7" cstate="print">
+            <a:extLst>
+              <a:ext uri="{28A0092B-C50C-407E-A947-70E740481C1C}">
+                <a14:useLocalDpi xmlns:a14="http://schemas.microsoft.com/office/drawing/2010/main" val="0"/>
+              </a:ext>
+            </a:extLst>
+          </a:blip>
+          <a:stretch>
+            <a:fillRect/>
+          </a:stretch>
+        </p:blipFill>
+        <p:spPr>
+          <a:xfrm>
+            <a:off x="4646051" y="3588125"/>
+            <a:ext cx="265378" cy="265378"/>
+          </a:xfrm>
+          <a:prstGeom prst="rect">
+            <a:avLst/>
+          </a:prstGeom>
+        </p:spPr>
+      </p:pic>
+      <p:pic>
+        <p:nvPicPr>
+          <p:cNvPr id="73" name="Picture 72">
+            <a:extLst>
+              <a:ext uri="{FF2B5EF4-FFF2-40B4-BE49-F238E27FC236}">
+                <a16:creationId xmlns:a16="http://schemas.microsoft.com/office/drawing/2014/main" id="{2F063387-5F57-A5F2-C0FD-2A55D6D5186B}"/>
+              </a:ext>
+            </a:extLst>
+          </p:cNvPr>
+          <p:cNvPicPr>
+            <a:picLocks noChangeAspect="1"/>
+          </p:cNvPicPr>
+          <p:nvPr/>
+        </p:nvPicPr>
+        <p:blipFill>
+          <a:blip r:embed="rId7" cstate="print">
+            <a:extLst>
+              <a:ext uri="{28A0092B-C50C-407E-A947-70E740481C1C}">
+                <a14:useLocalDpi xmlns:a14="http://schemas.microsoft.com/office/drawing/2010/main" val="0"/>
+              </a:ext>
+            </a:extLst>
+          </a:blip>
+          <a:stretch>
+            <a:fillRect/>
+          </a:stretch>
+        </p:blipFill>
+        <p:spPr>
+          <a:xfrm>
+            <a:off x="4855431" y="3589041"/>
+            <a:ext cx="265378" cy="265378"/>
+          </a:xfrm>
+          <a:prstGeom prst="rect">
+            <a:avLst/>
+          </a:prstGeom>
+        </p:spPr>
+      </p:pic>
+      <p:cxnSp>
+        <p:nvCxnSpPr>
+          <p:cNvPr id="100" name="Connector: Curved 99">
+            <a:extLst>
+              <a:ext uri="{FF2B5EF4-FFF2-40B4-BE49-F238E27FC236}">
+                <a16:creationId xmlns:a16="http://schemas.microsoft.com/office/drawing/2014/main" id="{39DF703B-EEC5-1B3D-4B35-3BABB6559947}"/>
+              </a:ext>
+            </a:extLst>
+          </p:cNvPr>
+          <p:cNvCxnSpPr>
+            <a:cxnSpLocks/>
+            <a:endCxn id="56" idx="2"/>
+          </p:cNvCxnSpPr>
+          <p:nvPr/>
+        </p:nvCxnSpPr>
+        <p:spPr>
+          <a:xfrm rot="10800000">
+            <a:off x="2377885" y="4136761"/>
+            <a:ext cx="1731558" cy="732592"/>
+          </a:xfrm>
+          <a:prstGeom prst="curvedConnector2">
+            <a:avLst/>
+          </a:prstGeom>
+          <a:ln w="12700">
+            <a:solidFill>
+              <a:schemeClr val="tx1"/>
+            </a:solidFill>
+            <a:tailEnd type="triangle"/>
+          </a:ln>
+        </p:spPr>
+        <p:style>
+          <a:lnRef idx="1">
+            <a:schemeClr val="accent1"/>
+          </a:lnRef>
+          <a:fillRef idx="0">
+            <a:schemeClr val="accent1"/>
+          </a:fillRef>
+          <a:effectRef idx="0">
+            <a:schemeClr val="accent1"/>
+          </a:effectRef>
+          <a:fontRef idx="minor">
+            <a:schemeClr val="tx1"/>
+          </a:fontRef>
+        </p:style>
+      </p:cxnSp>
+      <p:cxnSp>
+        <p:nvCxnSpPr>
+          <p:cNvPr id="103" name="Connector: Curved 102">
+            <a:extLst>
+              <a:ext uri="{FF2B5EF4-FFF2-40B4-BE49-F238E27FC236}">
+                <a16:creationId xmlns:a16="http://schemas.microsoft.com/office/drawing/2014/main" id="{E8AFDE4D-E606-30DF-2B1F-0B741A900A5B}"/>
+              </a:ext>
+            </a:extLst>
+          </p:cNvPr>
+          <p:cNvCxnSpPr>
+            <a:cxnSpLocks/>
+            <a:endCxn id="71" idx="1"/>
+          </p:cNvCxnSpPr>
+          <p:nvPr/>
+        </p:nvCxnSpPr>
+        <p:spPr>
+          <a:xfrm>
+            <a:off x="2798496" y="3530630"/>
+            <a:ext cx="1470638" cy="202802"/>
+          </a:xfrm>
+          <a:prstGeom prst="curvedConnector3">
+            <a:avLst>
+              <a:gd name="adj1" fmla="val 50000"/>
+            </a:avLst>
+          </a:prstGeom>
+          <a:ln w="12700">
+            <a:solidFill>
+              <a:schemeClr val="tx1"/>
+            </a:solidFill>
+            <a:tailEnd type="triangle"/>
+          </a:ln>
+        </p:spPr>
+        <p:style>
+          <a:lnRef idx="1">
+            <a:schemeClr val="accent1"/>
+          </a:lnRef>
+          <a:fillRef idx="0">
+            <a:schemeClr val="accent1"/>
+          </a:fillRef>
+          <a:effectRef idx="0">
+            <a:schemeClr val="accent1"/>
+          </a:effectRef>
+          <a:fontRef idx="minor">
+            <a:schemeClr val="tx1"/>
+          </a:fontRef>
+        </p:style>
+      </p:cxnSp>
+      <p:sp>
+        <p:nvSpPr>
+          <p:cNvPr id="56" name="Rounded Rectangle 10">
+            <a:extLst>
+              <a:ext uri="{FF2B5EF4-FFF2-40B4-BE49-F238E27FC236}">
+                <a16:creationId xmlns:a16="http://schemas.microsoft.com/office/drawing/2014/main" id="{7438059A-9EC4-4F6A-ACC3-0BA327ABAA24}"/>
+              </a:ext>
+            </a:extLst>
+          </p:cNvPr>
+          <p:cNvSpPr/>
+          <p:nvPr/>
+        </p:nvSpPr>
+        <p:spPr>
+          <a:xfrm>
+            <a:off x="1962405" y="3376311"/>
+            <a:ext cx="830959" cy="760450"/>
+          </a:xfrm>
+          <a:prstGeom prst="roundRect">
+            <a:avLst>
+              <a:gd name="adj" fmla="val 7525"/>
+            </a:avLst>
+          </a:prstGeom>
+          <a:solidFill>
+            <a:schemeClr val="tx1"/>
+          </a:solidFill>
+          <a:ln w="9525">
+            <a:solidFill>
+              <a:schemeClr val="bg1"/>
+            </a:solidFill>
+          </a:ln>
+          <a:effectLst/>
+        </p:spPr>
+        <p:style>
+          <a:lnRef idx="2">
+            <a:schemeClr val="dk1">
+              <a:shade val="50000"/>
+            </a:schemeClr>
+          </a:lnRef>
+          <a:fillRef idx="1">
+            <a:schemeClr val="dk1"/>
+          </a:fillRef>
+          <a:effectRef idx="0">
+            <a:schemeClr val="dk1"/>
+          </a:effectRef>
+          <a:fontRef idx="minor">
+            <a:schemeClr val="lt1"/>
+          </a:fontRef>
+        </p:style>
+        <p:txBody>
+          <a:bodyPr lIns="0" rIns="0" rtlCol="0" anchor="t"/>
+          <a:lstStyle/>
+          <a:p>
+            <a:pPr algn="ctr">
+              <a:defRPr/>
+            </a:pPr>
+            <a:r>
+              <a:rPr lang="en-US" sz="900" dirty="0">
+                <a:solidFill>
+                  <a:srgbClr val="FFFFFF"/>
+                </a:solidFill>
+                <a:latin typeface="Source Sans Pro Light" charset="0"/>
+                <a:ea typeface="Source Sans Pro Light" charset="0"/>
+                <a:cs typeface="Source Sans Pro Light" charset="0"/>
+              </a:rPr>
+              <a:t>.</a:t>
+            </a:r>
+            <a:r>
+              <a:rPr lang="en-US" sz="900" dirty="0" err="1">
+                <a:solidFill>
+                  <a:srgbClr val="FFFFFF"/>
+                </a:solidFill>
+                <a:latin typeface="Source Sans Pro Light" charset="0"/>
+                <a:ea typeface="Source Sans Pro Light" charset="0"/>
+                <a:cs typeface="Source Sans Pro Light" charset="0"/>
+              </a:rPr>
+              <a:t>fo</a:t>
+            </a:r>
+            <a:r>
+              <a:rPr lang="en-US" sz="900" dirty="0">
+                <a:solidFill>
+                  <a:srgbClr val="FFFFFF"/>
+                </a:solidFill>
+                <a:latin typeface="Source Sans Pro Light" charset="0"/>
+                <a:ea typeface="Source Sans Pro Light" charset="0"/>
+                <a:cs typeface="Source Sans Pro Light" charset="0"/>
+              </a:rPr>
+              <a:t> chunk Buffer</a:t>
+            </a:r>
+            <a:br>
+              <a:rPr lang="en-US" sz="900" dirty="0">
+                <a:solidFill>
+                  <a:srgbClr val="FFFFFF"/>
+                </a:solidFill>
+                <a:latin typeface="Source Sans Pro Light" charset="0"/>
+                <a:ea typeface="Source Sans Pro Light" charset="0"/>
+                <a:cs typeface="Source Sans Pro Light" charset="0"/>
+              </a:rPr>
+            </a:br>
+            <a:r>
+              <a:rPr lang="en-US" sz="900" dirty="0">
+                <a:solidFill>
+                  <a:srgbClr val="FFFFFF"/>
+                </a:solidFill>
+                <a:latin typeface="Source Sans Pro Light" charset="0"/>
+                <a:ea typeface="Source Sans Pro Light" charset="0"/>
+                <a:cs typeface="Source Sans Pro Light" charset="0"/>
+              </a:rPr>
+              <a:t>(min 512 bytes chunks)</a:t>
+            </a:r>
+          </a:p>
+        </p:txBody>
+      </p:sp>
+      <p:pic>
+        <p:nvPicPr>
+          <p:cNvPr id="57" name="Picture 56">
+            <a:extLst>
+              <a:ext uri="{FF2B5EF4-FFF2-40B4-BE49-F238E27FC236}">
+                <a16:creationId xmlns:a16="http://schemas.microsoft.com/office/drawing/2014/main" id="{0170A40C-1697-18ED-6137-FE9CF0252068}"/>
+              </a:ext>
+            </a:extLst>
+          </p:cNvPr>
+          <p:cNvPicPr>
+            <a:picLocks noChangeAspect="1"/>
+          </p:cNvPicPr>
+          <p:nvPr/>
+        </p:nvPicPr>
+        <p:blipFill>
+          <a:blip r:embed="rId10" cstate="print">
+            <a:lum bright="70000" contrast="-70000"/>
+            <a:extLst>
+              <a:ext uri="{28A0092B-C50C-407E-A947-70E740481C1C}">
+                <a14:useLocalDpi xmlns:a14="http://schemas.microsoft.com/office/drawing/2010/main" val="0"/>
+              </a:ext>
+            </a:extLst>
+          </a:blip>
+          <a:stretch>
+            <a:fillRect/>
+          </a:stretch>
+        </p:blipFill>
+        <p:spPr>
+          <a:xfrm>
+            <a:off x="2273806" y="3866774"/>
+            <a:ext cx="207006" cy="207006"/>
+          </a:xfrm>
+          <a:prstGeom prst="rect">
+            <a:avLst/>
+          </a:prstGeom>
+        </p:spPr>
+      </p:pic>
+      <p:pic>
+        <p:nvPicPr>
+          <p:cNvPr id="110" name="Picture 109">
+            <a:extLst>
+              <a:ext uri="{FF2B5EF4-FFF2-40B4-BE49-F238E27FC236}">
+                <a16:creationId xmlns:a16="http://schemas.microsoft.com/office/drawing/2014/main" id="{1EE21766-F16A-644F-1888-1D2B23F7E71B}"/>
+              </a:ext>
+            </a:extLst>
+          </p:cNvPr>
+          <p:cNvPicPr>
+            <a:picLocks noChangeAspect="1"/>
+          </p:cNvPicPr>
+          <p:nvPr/>
+        </p:nvPicPr>
+        <p:blipFill>
+          <a:blip r:embed="rId9" cstate="print">
+            <a:grayscl/>
+            <a:extLst>
+              <a:ext uri="{28A0092B-C50C-407E-A947-70E740481C1C}">
+                <a14:useLocalDpi xmlns:a14="http://schemas.microsoft.com/office/drawing/2010/main" val="0"/>
+              </a:ext>
+            </a:extLst>
+          </a:blip>
+          <a:stretch>
+            <a:fillRect/>
+          </a:stretch>
+        </p:blipFill>
+        <p:spPr>
+          <a:xfrm>
+            <a:off x="8366664" y="1335601"/>
+            <a:ext cx="132269" cy="132269"/>
+          </a:xfrm>
+          <a:prstGeom prst="rect">
+            <a:avLst/>
+          </a:prstGeom>
+        </p:spPr>
+      </p:pic>
+      <p:pic>
+        <p:nvPicPr>
+          <p:cNvPr id="114" name="Picture 113">
+            <a:extLst>
+              <a:ext uri="{FF2B5EF4-FFF2-40B4-BE49-F238E27FC236}">
+                <a16:creationId xmlns:a16="http://schemas.microsoft.com/office/drawing/2014/main" id="{6DF21705-3F5D-2F45-8451-302E3EA48F5C}"/>
+              </a:ext>
+            </a:extLst>
+          </p:cNvPr>
+          <p:cNvPicPr>
+            <a:picLocks noChangeAspect="1"/>
+          </p:cNvPicPr>
+          <p:nvPr/>
+        </p:nvPicPr>
+        <p:blipFill>
+          <a:blip r:embed="rId9" cstate="print">
+            <a:biLevel thresh="25000"/>
+            <a:extLst>
+              <a:ext uri="{28A0092B-C50C-407E-A947-70E740481C1C}">
+                <a14:useLocalDpi xmlns:a14="http://schemas.microsoft.com/office/drawing/2010/main" val="0"/>
+              </a:ext>
+            </a:extLst>
+          </a:blip>
+          <a:stretch>
+            <a:fillRect/>
+          </a:stretch>
+        </p:blipFill>
+        <p:spPr>
+          <a:xfrm>
+            <a:off x="8236342" y="3924153"/>
+            <a:ext cx="132269" cy="132269"/>
+          </a:xfrm>
+          <a:prstGeom prst="rect">
+            <a:avLst/>
+          </a:prstGeom>
+        </p:spPr>
+      </p:pic>
+      <p:pic>
+        <p:nvPicPr>
+          <p:cNvPr id="115" name="Picture 114">
+            <a:extLst>
+              <a:ext uri="{FF2B5EF4-FFF2-40B4-BE49-F238E27FC236}">
+                <a16:creationId xmlns:a16="http://schemas.microsoft.com/office/drawing/2014/main" id="{6519D86F-7D0E-CEDF-6971-1AC50F887C21}"/>
+              </a:ext>
+            </a:extLst>
+          </p:cNvPr>
+          <p:cNvPicPr>
+            <a:picLocks noChangeAspect="1"/>
+          </p:cNvPicPr>
+          <p:nvPr/>
+        </p:nvPicPr>
+        <p:blipFill>
+          <a:blip r:embed="rId9" cstate="print">
+            <a:biLevel thresh="25000"/>
+            <a:extLst>
+              <a:ext uri="{28A0092B-C50C-407E-A947-70E740481C1C}">
+                <a14:useLocalDpi xmlns:a14="http://schemas.microsoft.com/office/drawing/2010/main" val="0"/>
+              </a:ext>
+            </a:extLst>
+          </a:blip>
+          <a:stretch>
+            <a:fillRect/>
+          </a:stretch>
+        </p:blipFill>
+        <p:spPr>
+          <a:xfrm>
+            <a:off x="8346125" y="3924153"/>
+            <a:ext cx="132269" cy="132269"/>
+          </a:xfrm>
+          <a:prstGeom prst="rect">
+            <a:avLst/>
+          </a:prstGeom>
+        </p:spPr>
+      </p:pic>
+      <p:pic>
+        <p:nvPicPr>
+          <p:cNvPr id="116" name="Picture 115">
+            <a:extLst>
+              <a:ext uri="{FF2B5EF4-FFF2-40B4-BE49-F238E27FC236}">
+                <a16:creationId xmlns:a16="http://schemas.microsoft.com/office/drawing/2014/main" id="{2470D2C7-BDBE-98B2-F6DE-509A8AF97457}"/>
+              </a:ext>
+            </a:extLst>
+          </p:cNvPr>
+          <p:cNvPicPr>
+            <a:picLocks noChangeAspect="1"/>
+          </p:cNvPicPr>
+          <p:nvPr/>
+        </p:nvPicPr>
+        <p:blipFill>
+          <a:blip r:embed="rId9" cstate="print">
+            <a:biLevel thresh="25000"/>
+            <a:extLst>
+              <a:ext uri="{28A0092B-C50C-407E-A947-70E740481C1C}">
+                <a14:useLocalDpi xmlns:a14="http://schemas.microsoft.com/office/drawing/2010/main" val="0"/>
+              </a:ext>
+            </a:extLst>
+          </a:blip>
+          <a:stretch>
+            <a:fillRect/>
+          </a:stretch>
+        </p:blipFill>
+        <p:spPr>
+          <a:xfrm>
+            <a:off x="8225099" y="3811286"/>
+            <a:ext cx="132269" cy="132269"/>
+          </a:xfrm>
+          <a:prstGeom prst="rect">
+            <a:avLst/>
+          </a:prstGeom>
+        </p:spPr>
+      </p:pic>
+      <p:pic>
+        <p:nvPicPr>
+          <p:cNvPr id="117" name="Picture 116">
+            <a:extLst>
+              <a:ext uri="{FF2B5EF4-FFF2-40B4-BE49-F238E27FC236}">
+                <a16:creationId xmlns:a16="http://schemas.microsoft.com/office/drawing/2014/main" id="{D2F8B597-BE92-9DDC-96B4-131CDECF35D2}"/>
+              </a:ext>
+            </a:extLst>
+          </p:cNvPr>
+          <p:cNvPicPr>
+            <a:picLocks noChangeAspect="1"/>
+          </p:cNvPicPr>
+          <p:nvPr/>
+        </p:nvPicPr>
+        <p:blipFill>
+          <a:blip r:embed="rId9" cstate="print">
+            <a:biLevel thresh="25000"/>
+            <a:extLst>
+              <a:ext uri="{28A0092B-C50C-407E-A947-70E740481C1C}">
+                <a14:useLocalDpi xmlns:a14="http://schemas.microsoft.com/office/drawing/2010/main" val="0"/>
+              </a:ext>
+            </a:extLst>
+          </a:blip>
+          <a:stretch>
+            <a:fillRect/>
+          </a:stretch>
+        </p:blipFill>
+        <p:spPr>
+          <a:xfrm>
+            <a:off x="8346125" y="3847805"/>
+            <a:ext cx="132269" cy="132269"/>
+          </a:xfrm>
+          <a:prstGeom prst="rect">
+            <a:avLst/>
+          </a:prstGeom>
+        </p:spPr>
+      </p:pic>
+      <p:pic>
+        <p:nvPicPr>
+          <p:cNvPr id="130" name="Picture 129">
+            <a:extLst>
+              <a:ext uri="{FF2B5EF4-FFF2-40B4-BE49-F238E27FC236}">
+                <a16:creationId xmlns:a16="http://schemas.microsoft.com/office/drawing/2014/main" id="{7359DFC2-7E1D-622C-C990-6AE24D6CF7EA}"/>
+              </a:ext>
+            </a:extLst>
+          </p:cNvPr>
+          <p:cNvPicPr>
+            <a:picLocks noChangeAspect="1"/>
+          </p:cNvPicPr>
+          <p:nvPr/>
+        </p:nvPicPr>
+        <p:blipFill>
+          <a:blip r:embed="rId9" cstate="print">
+            <a:grayscl/>
+            <a:extLst>
+              <a:ext uri="{28A0092B-C50C-407E-A947-70E740481C1C}">
+                <a14:useLocalDpi xmlns:a14="http://schemas.microsoft.com/office/drawing/2010/main" val="0"/>
+              </a:ext>
+            </a:extLst>
+          </a:blip>
+          <a:stretch>
+            <a:fillRect/>
+          </a:stretch>
+        </p:blipFill>
+        <p:spPr>
+          <a:xfrm>
+            <a:off x="8366664" y="2212037"/>
+            <a:ext cx="132269" cy="132269"/>
+          </a:xfrm>
+          <a:prstGeom prst="rect">
+            <a:avLst/>
+          </a:prstGeom>
+        </p:spPr>
+      </p:pic>
+      <p:pic>
+        <p:nvPicPr>
+          <p:cNvPr id="131" name="Picture 130">
+            <a:extLst>
+              <a:ext uri="{FF2B5EF4-FFF2-40B4-BE49-F238E27FC236}">
+                <a16:creationId xmlns:a16="http://schemas.microsoft.com/office/drawing/2014/main" id="{65754270-3D4A-444E-880A-6E23B8A188B7}"/>
+              </a:ext>
+            </a:extLst>
+          </p:cNvPr>
+          <p:cNvPicPr>
+            <a:picLocks noChangeAspect="1"/>
+          </p:cNvPicPr>
+          <p:nvPr/>
+        </p:nvPicPr>
+        <p:blipFill>
+          <a:blip r:embed="rId9" cstate="print">
+            <a:grayscl/>
+            <a:extLst>
+              <a:ext uri="{28A0092B-C50C-407E-A947-70E740481C1C}">
+                <a14:useLocalDpi xmlns:a14="http://schemas.microsoft.com/office/drawing/2010/main" val="0"/>
+              </a:ext>
+            </a:extLst>
+          </a:blip>
+          <a:stretch>
+            <a:fillRect/>
+          </a:stretch>
+        </p:blipFill>
+        <p:spPr>
+          <a:xfrm>
+            <a:off x="8366664" y="1090769"/>
+            <a:ext cx="132269" cy="132269"/>
+          </a:xfrm>
+          <a:prstGeom prst="rect">
+            <a:avLst/>
+          </a:prstGeom>
+        </p:spPr>
+      </p:pic>
+      <p:pic>
+        <p:nvPicPr>
+          <p:cNvPr id="132" name="Picture 131">
+            <a:extLst>
+              <a:ext uri="{FF2B5EF4-FFF2-40B4-BE49-F238E27FC236}">
+                <a16:creationId xmlns:a16="http://schemas.microsoft.com/office/drawing/2014/main" id="{F4FCE97A-8358-FB2D-82DD-3A3D0578AA62}"/>
+              </a:ext>
+            </a:extLst>
+          </p:cNvPr>
+          <p:cNvPicPr>
+            <a:picLocks noChangeAspect="1"/>
+          </p:cNvPicPr>
+          <p:nvPr/>
+        </p:nvPicPr>
+        <p:blipFill>
+          <a:blip r:embed="rId9" cstate="print">
+            <a:grayscl/>
+            <a:extLst>
+              <a:ext uri="{28A0092B-C50C-407E-A947-70E740481C1C}">
+                <a14:useLocalDpi xmlns:a14="http://schemas.microsoft.com/office/drawing/2010/main" val="0"/>
+              </a:ext>
+            </a:extLst>
+          </a:blip>
+          <a:stretch>
+            <a:fillRect/>
+          </a:stretch>
+        </p:blipFill>
+        <p:spPr>
+          <a:xfrm>
+            <a:off x="1959692" y="857367"/>
+            <a:ext cx="132269" cy="132269"/>
+          </a:xfrm>
+          <a:prstGeom prst="rect">
+            <a:avLst/>
+          </a:prstGeom>
+        </p:spPr>
+      </p:pic>
+      <p:sp>
+        <p:nvSpPr>
+          <p:cNvPr id="133" name="TextBox 132">
+            <a:extLst>
+              <a:ext uri="{FF2B5EF4-FFF2-40B4-BE49-F238E27FC236}">
+                <a16:creationId xmlns:a16="http://schemas.microsoft.com/office/drawing/2014/main" id="{12F6882E-39B1-F931-958F-45A54C1F5BC7}"/>
+              </a:ext>
+            </a:extLst>
+          </p:cNvPr>
+          <p:cNvSpPr txBox="1"/>
+          <p:nvPr/>
+        </p:nvSpPr>
+        <p:spPr>
+          <a:xfrm>
+            <a:off x="2214521" y="933087"/>
+            <a:ext cx="907451" cy="430887"/>
+          </a:xfrm>
+          <a:prstGeom prst="rect">
+            <a:avLst/>
+          </a:prstGeom>
+          <a:noFill/>
+        </p:spPr>
+        <p:txBody>
+          <a:bodyPr vert="horz" wrap="square" lIns="0" tIns="0" rIns="0" bIns="0" numCol="1" spcCol="288000" rtlCol="0" anchor="t" anchorCtr="0">
+            <a:spAutoFit/>
+          </a:bodyPr>
+          <a:lstStyle/>
+          <a:p>
+            <a:pPr algn="l">
+              <a:spcBef>
+                <a:spcPts val="0"/>
+              </a:spcBef>
+              <a:spcAft>
+                <a:spcPts val="600"/>
+              </a:spcAft>
+            </a:pPr>
+            <a:r>
+              <a:rPr lang="en-US" sz="1400" b="0" i="0" spc="0" dirty="0">
+                <a:ln>
+                  <a:noFill/>
+                </a:ln>
+                <a:solidFill>
+                  <a:schemeClr val="tx2"/>
+                </a:solidFill>
+                <a:latin typeface="Source Sans Pro Light" charset="0"/>
+                <a:ea typeface="Source Sans Pro Light" charset="0"/>
+                <a:cs typeface="Source Sans Pro Light" charset="0"/>
+              </a:rPr>
+              <a:t>App.fo</a:t>
+            </a:r>
+            <a:br>
+              <a:rPr lang="en-US" sz="1400" b="0" i="0" spc="0" dirty="0">
+                <a:ln>
+                  <a:noFill/>
+                </a:ln>
+                <a:solidFill>
+                  <a:schemeClr val="tx2"/>
+                </a:solidFill>
+                <a:latin typeface="Source Sans Pro Light" charset="0"/>
+                <a:ea typeface="Source Sans Pro Light" charset="0"/>
+                <a:cs typeface="Source Sans Pro Light" charset="0"/>
+              </a:rPr>
+            </a:br>
+            <a:r>
+              <a:rPr lang="en-US" sz="1400" b="0" i="0" spc="0" dirty="0">
+                <a:ln>
+                  <a:noFill/>
+                </a:ln>
+                <a:solidFill>
+                  <a:schemeClr val="tx2"/>
+                </a:solidFill>
+                <a:latin typeface="Source Sans Pro Light" charset="0"/>
+                <a:ea typeface="Source Sans Pro Light" charset="0"/>
+                <a:cs typeface="Source Sans Pro Light" charset="0"/>
+              </a:rPr>
+              <a:t>packets</a:t>
+            </a:r>
+          </a:p>
+        </p:txBody>
+      </p:sp>
+      <p:pic>
+        <p:nvPicPr>
+          <p:cNvPr id="134" name="Picture 133">
+            <a:extLst>
+              <a:ext uri="{FF2B5EF4-FFF2-40B4-BE49-F238E27FC236}">
+                <a16:creationId xmlns:a16="http://schemas.microsoft.com/office/drawing/2014/main" id="{C4E456AE-AE82-DD4B-9B73-F6DAE31F3518}"/>
+              </a:ext>
+            </a:extLst>
+          </p:cNvPr>
+          <p:cNvPicPr>
+            <a:picLocks noChangeAspect="1"/>
+          </p:cNvPicPr>
+          <p:nvPr/>
+        </p:nvPicPr>
+        <p:blipFill>
+          <a:blip r:embed="rId9" cstate="print">
+            <a:grayscl/>
+            <a:extLst>
+              <a:ext uri="{28A0092B-C50C-407E-A947-70E740481C1C}">
+                <a14:useLocalDpi xmlns:a14="http://schemas.microsoft.com/office/drawing/2010/main" val="0"/>
+              </a:ext>
+            </a:extLst>
+          </a:blip>
+          <a:stretch>
+            <a:fillRect/>
+          </a:stretch>
+        </p:blipFill>
+        <p:spPr>
+          <a:xfrm>
+            <a:off x="1959692" y="1365948"/>
+            <a:ext cx="132269" cy="132269"/>
+          </a:xfrm>
+          <a:prstGeom prst="rect">
+            <a:avLst/>
+          </a:prstGeom>
+        </p:spPr>
+      </p:pic>
+      <p:pic>
+        <p:nvPicPr>
+          <p:cNvPr id="135" name="Picture 134">
+            <a:extLst>
+              <a:ext uri="{FF2B5EF4-FFF2-40B4-BE49-F238E27FC236}">
+                <a16:creationId xmlns:a16="http://schemas.microsoft.com/office/drawing/2014/main" id="{9DC6170F-6A45-C556-876D-723EF6C74B20}"/>
+              </a:ext>
+            </a:extLst>
+          </p:cNvPr>
+          <p:cNvPicPr>
+            <a:picLocks noChangeAspect="1"/>
+          </p:cNvPicPr>
+          <p:nvPr/>
+        </p:nvPicPr>
+        <p:blipFill>
+          <a:blip r:embed="rId9" cstate="print">
+            <a:grayscl/>
+            <a:extLst>
+              <a:ext uri="{28A0092B-C50C-407E-A947-70E740481C1C}">
+                <a14:useLocalDpi xmlns:a14="http://schemas.microsoft.com/office/drawing/2010/main" val="0"/>
+              </a:ext>
+            </a:extLst>
+          </a:blip>
+          <a:stretch>
+            <a:fillRect/>
+          </a:stretch>
+        </p:blipFill>
+        <p:spPr>
+          <a:xfrm>
+            <a:off x="1959692" y="2242384"/>
+            <a:ext cx="132269" cy="132269"/>
+          </a:xfrm>
+          <a:prstGeom prst="rect">
+            <a:avLst/>
+          </a:prstGeom>
+        </p:spPr>
+      </p:pic>
+      <p:pic>
+        <p:nvPicPr>
+          <p:cNvPr id="136" name="Picture 135">
+            <a:extLst>
+              <a:ext uri="{FF2B5EF4-FFF2-40B4-BE49-F238E27FC236}">
+                <a16:creationId xmlns:a16="http://schemas.microsoft.com/office/drawing/2014/main" id="{B629A8A8-6C7A-B878-95B7-804DB019F599}"/>
+              </a:ext>
+            </a:extLst>
+          </p:cNvPr>
+          <p:cNvPicPr>
+            <a:picLocks noChangeAspect="1"/>
+          </p:cNvPicPr>
+          <p:nvPr/>
+        </p:nvPicPr>
+        <p:blipFill>
+          <a:blip r:embed="rId9" cstate="print">
+            <a:grayscl/>
+            <a:extLst>
+              <a:ext uri="{28A0092B-C50C-407E-A947-70E740481C1C}">
+                <a14:useLocalDpi xmlns:a14="http://schemas.microsoft.com/office/drawing/2010/main" val="0"/>
+              </a:ext>
+            </a:extLst>
+          </a:blip>
+          <a:stretch>
+            <a:fillRect/>
+          </a:stretch>
+        </p:blipFill>
+        <p:spPr>
+          <a:xfrm>
+            <a:off x="1959692" y="1121116"/>
+            <a:ext cx="132269" cy="132269"/>
+          </a:xfrm>
+          <a:prstGeom prst="rect">
+            <a:avLst/>
+          </a:prstGeom>
+        </p:spPr>
+      </p:pic>
     </p:spTree>
     <p:extLst>
       <p:ext uri="{BB962C8B-B14F-4D97-AF65-F5344CB8AC3E}">

</xml_diff>